<commit_message>
factory method class diagram inserted
</commit_message>
<xml_diff>
--- a/HOTEL MANAGEMENT SYSTEM.pptx
+++ b/HOTEL MANAGEMENT SYSTEM.pptx
@@ -112,6 +112,11 @@
       </a:defRPr>
     </a:lvl9pPr>
   </p:defaultTextStyle>
+  <p:extLst>
+    <p:ext uri="{EFAFB233-063F-42B5-8137-9DF3F51BA10A}">
+      <p15:sldGuideLst xmlns:p15="http://schemas.microsoft.com/office/powerpoint/2012/main"/>
+    </p:ext>
+  </p:extLst>
 </p:presentation>
 </file>
 
@@ -617,7 +622,7 @@
           <a:p>
             <a:fld id="{A94AF207-CDB6-4763-BADD-F0ED018FC327}" type="datetimeFigureOut">
               <a:rPr lang="en-US" smtClean="0"/>
-              <a:t>12/2/2016</a:t>
+              <a:t>12/5/2016</a:t>
             </a:fld>
             <a:endParaRPr lang="en-US"/>
           </a:p>
@@ -913,7 +918,7 @@
           <a:p>
             <a:fld id="{A94AF207-CDB6-4763-BADD-F0ED018FC327}" type="datetimeFigureOut">
               <a:rPr lang="en-US" smtClean="0"/>
-              <a:t>12/2/2016</a:t>
+              <a:t>12/5/2016</a:t>
             </a:fld>
             <a:endParaRPr lang="en-US"/>
           </a:p>
@@ -1161,7 +1166,7 @@
           <a:p>
             <a:fld id="{A94AF207-CDB6-4763-BADD-F0ED018FC327}" type="datetimeFigureOut">
               <a:rPr lang="en-US" smtClean="0"/>
-              <a:t>12/2/2016</a:t>
+              <a:t>12/5/2016</a:t>
             </a:fld>
             <a:endParaRPr lang="en-US"/>
           </a:p>
@@ -1701,7 +1706,7 @@
           <a:p>
             <a:fld id="{A94AF207-CDB6-4763-BADD-F0ED018FC327}" type="datetimeFigureOut">
               <a:rPr lang="en-US" smtClean="0"/>
-              <a:t>12/2/2016</a:t>
+              <a:t>12/5/2016</a:t>
             </a:fld>
             <a:endParaRPr lang="en-US"/>
           </a:p>
@@ -1949,7 +1954,7 @@
           <a:p>
             <a:fld id="{A94AF207-CDB6-4763-BADD-F0ED018FC327}" type="datetimeFigureOut">
               <a:rPr lang="en-US" smtClean="0"/>
-              <a:t>12/2/2016</a:t>
+              <a:t>12/5/2016</a:t>
             </a:fld>
             <a:endParaRPr lang="en-US"/>
           </a:p>
@@ -2481,7 +2486,7 @@
           <a:p>
             <a:fld id="{A94AF207-CDB6-4763-BADD-F0ED018FC327}" type="datetimeFigureOut">
               <a:rPr lang="en-US" smtClean="0"/>
-              <a:t>12/2/2016</a:t>
+              <a:t>12/5/2016</a:t>
             </a:fld>
             <a:endParaRPr lang="en-US"/>
           </a:p>
@@ -2778,7 +2783,7 @@
           <a:p>
             <a:fld id="{A94AF207-CDB6-4763-BADD-F0ED018FC327}" type="datetimeFigureOut">
               <a:rPr lang="en-US" smtClean="0"/>
-              <a:t>12/2/2016</a:t>
+              <a:t>12/5/2016</a:t>
             </a:fld>
             <a:endParaRPr lang="en-US"/>
           </a:p>
@@ -2952,7 +2957,7 @@
           <a:p>
             <a:fld id="{A94AF207-CDB6-4763-BADD-F0ED018FC327}" type="datetimeFigureOut">
               <a:rPr lang="en-US" smtClean="0"/>
-              <a:t>12/2/2016</a:t>
+              <a:t>12/5/2016</a:t>
             </a:fld>
             <a:endParaRPr lang="en-US"/>
           </a:p>
@@ -3132,7 +3137,7 @@
           <a:p>
             <a:fld id="{A94AF207-CDB6-4763-BADD-F0ED018FC327}" type="datetimeFigureOut">
               <a:rPr lang="en-US" smtClean="0"/>
-              <a:t>12/2/2016</a:t>
+              <a:t>12/5/2016</a:t>
             </a:fld>
             <a:endParaRPr lang="en-US"/>
           </a:p>
@@ -3302,7 +3307,7 @@
           <a:p>
             <a:fld id="{A94AF207-CDB6-4763-BADD-F0ED018FC327}" type="datetimeFigureOut">
               <a:rPr lang="en-US" smtClean="0"/>
-              <a:t>12/2/2016</a:t>
+              <a:t>12/5/2016</a:t>
             </a:fld>
             <a:endParaRPr lang="en-US"/>
           </a:p>
@@ -3553,7 +3558,7 @@
           <a:p>
             <a:fld id="{A94AF207-CDB6-4763-BADD-F0ED018FC327}" type="datetimeFigureOut">
               <a:rPr lang="en-US" smtClean="0"/>
-              <a:t>12/2/2016</a:t>
+              <a:t>12/5/2016</a:t>
             </a:fld>
             <a:endParaRPr lang="en-US"/>
           </a:p>
@@ -3850,7 +3855,7 @@
           <a:p>
             <a:fld id="{A94AF207-CDB6-4763-BADD-F0ED018FC327}" type="datetimeFigureOut">
               <a:rPr lang="en-US" smtClean="0"/>
-              <a:t>12/2/2016</a:t>
+              <a:t>12/5/2016</a:t>
             </a:fld>
             <a:endParaRPr lang="en-US"/>
           </a:p>
@@ -4292,7 +4297,7 @@
           <a:p>
             <a:fld id="{A94AF207-CDB6-4763-BADD-F0ED018FC327}" type="datetimeFigureOut">
               <a:rPr lang="en-US" smtClean="0"/>
-              <a:t>12/2/2016</a:t>
+              <a:t>12/5/2016</a:t>
             </a:fld>
             <a:endParaRPr lang="en-US"/>
           </a:p>
@@ -4410,7 +4415,7 @@
           <a:p>
             <a:fld id="{A94AF207-CDB6-4763-BADD-F0ED018FC327}" type="datetimeFigureOut">
               <a:rPr lang="en-US" smtClean="0"/>
-              <a:t>12/2/2016</a:t>
+              <a:t>12/5/2016</a:t>
             </a:fld>
             <a:endParaRPr lang="en-US"/>
           </a:p>
@@ -4505,7 +4510,7 @@
           <a:p>
             <a:fld id="{A94AF207-CDB6-4763-BADD-F0ED018FC327}" type="datetimeFigureOut">
               <a:rPr lang="en-US" smtClean="0"/>
-              <a:t>12/2/2016</a:t>
+              <a:t>12/5/2016</a:t>
             </a:fld>
             <a:endParaRPr lang="en-US"/>
           </a:p>
@@ -4788,7 +4793,7 @@
           <a:p>
             <a:fld id="{A94AF207-CDB6-4763-BADD-F0ED018FC327}" type="datetimeFigureOut">
               <a:rPr lang="en-US" smtClean="0"/>
-              <a:t>12/2/2016</a:t>
+              <a:t>12/5/2016</a:t>
             </a:fld>
             <a:endParaRPr lang="en-US"/>
           </a:p>
@@ -5079,7 +5084,7 @@
           <a:p>
             <a:fld id="{A94AF207-CDB6-4763-BADD-F0ED018FC327}" type="datetimeFigureOut">
               <a:rPr lang="en-US" smtClean="0"/>
-              <a:t>12/2/2016</a:t>
+              <a:t>12/5/2016</a:t>
             </a:fld>
             <a:endParaRPr lang="en-US"/>
           </a:p>
@@ -5609,7 +5614,7 @@
           <a:p>
             <a:fld id="{A94AF207-CDB6-4763-BADD-F0ED018FC327}" type="datetimeFigureOut">
               <a:rPr lang="en-US" smtClean="0"/>
-              <a:t>12/2/2016</a:t>
+              <a:t>12/5/2016</a:t>
             </a:fld>
             <a:endParaRPr lang="en-US"/>
           </a:p>
@@ -6439,7 +6444,12 @@
             <p:ph type="title"/>
           </p:nvPr>
         </p:nvSpPr>
-        <p:spPr/>
+        <p:spPr>
+          <a:xfrm>
+            <a:off x="1412608" y="0"/>
+            <a:ext cx="10018713" cy="1752599"/>
+          </a:xfrm>
+        </p:spPr>
         <p:txBody>
           <a:bodyPr/>
           <a:lstStyle/>
@@ -6452,25 +6462,35 @@
           </a:p>
         </p:txBody>
       </p:sp>
-      <p:sp>
-        <p:nvSpPr>
-          <p:cNvPr id="3" name="Content Placeholder 2"/>
-          <p:cNvSpPr>
-            <a:spLocks noGrp="1"/>
-          </p:cNvSpPr>
+      <p:pic>
+        <p:nvPicPr>
+          <p:cNvPr id="2" name="Content Placeholder 1"/>
+          <p:cNvPicPr>
+            <a:picLocks noGrp="1" noChangeAspect="1"/>
+          </p:cNvPicPr>
           <p:nvPr>
             <p:ph idx="1"/>
           </p:nvPr>
-        </p:nvSpPr>
-        <p:spPr/>
-        <p:txBody>
-          <a:bodyPr/>
-          <a:lstStyle/>
-          <a:p>
-            <a:endParaRPr lang="en-US" dirty="0"/>
-          </a:p>
-        </p:txBody>
-      </p:sp>
+        </p:nvPicPr>
+        <p:blipFill>
+          <a:blip r:embed="rId2">
+            <a:extLst>
+              <a:ext uri="{28A0092B-C50C-407E-A947-70E740481C1C}">
+                <a14:useLocalDpi xmlns:a14="http://schemas.microsoft.com/office/drawing/2010/main" val="0"/>
+              </a:ext>
+            </a:extLst>
+          </a:blip>
+          <a:stretch>
+            <a:fillRect/>
+          </a:stretch>
+        </p:blipFill>
+        <p:spPr>
+          <a:xfrm>
+            <a:off x="2124762" y="1557615"/>
+            <a:ext cx="9306559" cy="5089938"/>
+          </a:xfrm>
+        </p:spPr>
+      </p:pic>
     </p:spTree>
     <p:extLst>
       <p:ext uri="{BB962C8B-B14F-4D97-AF65-F5344CB8AC3E}">
@@ -6669,10 +6689,10 @@
           <a:lstStyle/>
           <a:p>
             <a:r>
-              <a:rPr lang="en-US" sz="3000" dirty="0" smtClean="0"/>
+              <a:rPr lang="en-US" dirty="0" smtClean="0"/>
               <a:t>FUTURE DESIGN PATTERNS </a:t>
             </a:r>
-            <a:endParaRPr lang="en-US" sz="3000" dirty="0"/>
+            <a:endParaRPr lang="en-US" dirty="0"/>
           </a:p>
         </p:txBody>
       </p:sp>

</xml_diff>